<commit_message>
add days / month render to demo
</commit_message>
<xml_diff>
--- a/Redux/Another Redux Talk.pptx
+++ b/Redux/Another Redux Talk.pptx
@@ -9,6 +9,8 @@
     <p:sldId id="257" r:id="rId3"/>
     <p:sldId id="258" r:id="rId4"/>
     <p:sldId id="259" r:id="rId5"/>
+    <p:sldId id="260" r:id="rId6"/>
+    <p:sldId id="261" r:id="rId7"/>
   </p:sldIdLst>
   <p:sldSz cx="12192000" cy="6858000"/>
   <p:notesSz cx="6858000" cy="9144000"/>
@@ -6549,6 +6551,746 @@
 </p:sld>
 </file>
 
+<file path=ppt/slides/slide5.xml><?xml version="1.0" encoding="utf-8"?>
+<p:sld xmlns:a="http://schemas.openxmlformats.org/drawingml/2006/main" xmlns:r="http://schemas.openxmlformats.org/officeDocument/2006/relationships" xmlns:p="http://schemas.openxmlformats.org/presentationml/2006/main">
+  <p:cSld>
+    <p:bg>
+      <p:bgPr>
+        <a:solidFill>
+          <a:schemeClr val="bg1"/>
+        </a:solidFill>
+        <a:effectLst/>
+      </p:bgPr>
+    </p:bg>
+    <p:spTree>
+      <p:nvGrpSpPr>
+        <p:cNvPr id="1" name=""/>
+        <p:cNvGrpSpPr/>
+        <p:nvPr/>
+      </p:nvGrpSpPr>
+      <p:grpSpPr>
+        <a:xfrm>
+          <a:off x="0" y="0"/>
+          <a:ext cx="0" cy="0"/>
+          <a:chOff x="0" y="0"/>
+          <a:chExt cx="0" cy="0"/>
+        </a:xfrm>
+      </p:grpSpPr>
+      <p:pic>
+        <p:nvPicPr>
+          <p:cNvPr id="3076" name="Picture 70">
+            <a:extLst>
+              <a:ext uri="{FF2B5EF4-FFF2-40B4-BE49-F238E27FC236}">
+                <a16:creationId xmlns:a16="http://schemas.microsoft.com/office/drawing/2014/main" id="{5C819037-A607-4A7B-ADF1-B04516199C89}"/>
+              </a:ext>
+              <a:ext uri="{C183D7F6-B498-43B3-948B-1728B52AA6E4}">
+                <adec:decorative xmlns:adec="http://schemas.microsoft.com/office/drawing/2017/decorative" val="1"/>
+              </a:ext>
+            </a:extLst>
+          </p:cNvPr>
+          <p:cNvPicPr>
+            <a:picLocks noGrp="1" noRot="1" noChangeAspect="1" noMove="1" noResize="1" noEditPoints="1" noAdjustHandles="1" noChangeArrowheads="1" noChangeShapeType="1" noCrop="1"/>
+          </p:cNvPicPr>
+          <p:nvPr>
+            <p:extLst>
+              <p:ext uri="{386F3935-93C4-4BCD-93E2-E3B085C9AB24}">
+                <p16:designElem xmlns:p16="http://schemas.microsoft.com/office/powerpoint/2015/main" val="1"/>
+              </p:ext>
+            </p:extLst>
+          </p:nvPr>
+        </p:nvPicPr>
+        <p:blipFill>
+          <a:blip r:embed="rId2">
+            <a:extLst>
+              <a:ext uri="{28A0092B-C50C-407E-A947-70E740481C1C}">
+                <a14:useLocalDpi xmlns:a14="http://schemas.microsoft.com/office/drawing/2010/main" val="0"/>
+              </a:ext>
+            </a:extLst>
+          </a:blip>
+          <a:stretch>
+            <a:fillRect/>
+          </a:stretch>
+        </p:blipFill>
+        <p:spPr>
+          <a:xfrm>
+            <a:off x="0" y="0"/>
+            <a:ext cx="12188825" cy="6856214"/>
+          </a:xfrm>
+          <a:prstGeom prst="rect">
+            <a:avLst/>
+          </a:prstGeom>
+        </p:spPr>
+      </p:pic>
+      <p:sp>
+        <p:nvSpPr>
+          <p:cNvPr id="3077" name="Rectangle 72">
+            <a:extLst>
+              <a:ext uri="{FF2B5EF4-FFF2-40B4-BE49-F238E27FC236}">
+                <a16:creationId xmlns:a16="http://schemas.microsoft.com/office/drawing/2014/main" id="{F8C668FA-2417-47B5-B454-2D55FC17FF7A}"/>
+              </a:ext>
+              <a:ext uri="{C183D7F6-B498-43B3-948B-1728B52AA6E4}">
+                <adec:decorative xmlns:adec="http://schemas.microsoft.com/office/drawing/2017/decorative" val="1"/>
+              </a:ext>
+            </a:extLst>
+          </p:cNvPr>
+          <p:cNvSpPr>
+            <a:spLocks noGrp="1" noRot="1" noChangeAspect="1" noMove="1" noResize="1" noEditPoints="1" noAdjustHandles="1" noChangeArrowheads="1" noChangeShapeType="1" noTextEdit="1"/>
+          </p:cNvSpPr>
+          <p:nvPr>
+            <p:extLst>
+              <p:ext uri="{386F3935-93C4-4BCD-93E2-E3B085C9AB24}">
+                <p16:designElem xmlns:p16="http://schemas.microsoft.com/office/powerpoint/2015/main" val="1"/>
+              </p:ext>
+            </p:extLst>
+          </p:nvPr>
+        </p:nvSpPr>
+        <p:spPr>
+          <a:xfrm>
+            <a:off x="0" y="0"/>
+            <a:ext cx="12192000" cy="6858000"/>
+          </a:xfrm>
+          <a:prstGeom prst="rect">
+            <a:avLst/>
+          </a:prstGeom>
+          <a:ln>
+            <a:noFill/>
+          </a:ln>
+        </p:spPr>
+        <p:style>
+          <a:lnRef idx="2">
+            <a:schemeClr val="accent1">
+              <a:shade val="50000"/>
+            </a:schemeClr>
+          </a:lnRef>
+          <a:fillRef idx="1003">
+            <a:schemeClr val="dk2"/>
+          </a:fillRef>
+          <a:effectRef idx="0">
+            <a:schemeClr val="accent1"/>
+          </a:effectRef>
+          <a:fontRef idx="minor">
+            <a:schemeClr val="lt1"/>
+          </a:fontRef>
+        </p:style>
+        <p:txBody>
+          <a:bodyPr rtlCol="0" anchor="ctr"/>
+          <a:lstStyle/>
+          <a:p>
+            <a:pPr algn="ctr"/>
+            <a:endParaRPr lang="en-US"/>
+          </a:p>
+        </p:txBody>
+      </p:sp>
+      <p:pic>
+        <p:nvPicPr>
+          <p:cNvPr id="3078" name="Picture 74">
+            <a:extLst>
+              <a:ext uri="{FF2B5EF4-FFF2-40B4-BE49-F238E27FC236}">
+                <a16:creationId xmlns:a16="http://schemas.microsoft.com/office/drawing/2014/main" id="{97FEBA57-8992-46BB-BCF0-5A83FE8E01E8}"/>
+              </a:ext>
+              <a:ext uri="{C183D7F6-B498-43B3-948B-1728B52AA6E4}">
+                <adec:decorative xmlns:adec="http://schemas.microsoft.com/office/drawing/2017/decorative" val="1"/>
+              </a:ext>
+            </a:extLst>
+          </p:cNvPr>
+          <p:cNvPicPr>
+            <a:picLocks noGrp="1" noRot="1" noChangeAspect="1" noMove="1" noResize="1" noEditPoints="1" noAdjustHandles="1" noChangeArrowheads="1" noChangeShapeType="1" noCrop="1"/>
+          </p:cNvPicPr>
+          <p:nvPr>
+            <p:extLst>
+              <p:ext uri="{386F3935-93C4-4BCD-93E2-E3B085C9AB24}">
+                <p16:designElem xmlns:p16="http://schemas.microsoft.com/office/powerpoint/2015/main" val="1"/>
+              </p:ext>
+            </p:extLst>
+          </p:nvPr>
+        </p:nvPicPr>
+        <p:blipFill>
+          <a:blip r:embed="rId2">
+            <a:extLst>
+              <a:ext uri="{28A0092B-C50C-407E-A947-70E740481C1C}">
+                <a14:useLocalDpi xmlns:a14="http://schemas.microsoft.com/office/drawing/2010/main" val="0"/>
+              </a:ext>
+            </a:extLst>
+          </a:blip>
+          <a:stretch>
+            <a:fillRect/>
+          </a:stretch>
+        </p:blipFill>
+        <p:spPr>
+          <a:xfrm>
+            <a:off x="0" y="0"/>
+            <a:ext cx="12188825" cy="6856214"/>
+          </a:xfrm>
+          <a:prstGeom prst="rect">
+            <a:avLst/>
+          </a:prstGeom>
+        </p:spPr>
+      </p:pic>
+      <p:sp>
+        <p:nvSpPr>
+          <p:cNvPr id="77" name="Rectangle 76">
+            <a:extLst>
+              <a:ext uri="{FF2B5EF4-FFF2-40B4-BE49-F238E27FC236}">
+                <a16:creationId xmlns:a16="http://schemas.microsoft.com/office/drawing/2014/main" id="{2B4CDDF6-55C3-415A-8D8B-7E03C3D616FC}"/>
+              </a:ext>
+              <a:ext uri="{C183D7F6-B498-43B3-948B-1728B52AA6E4}">
+                <adec:decorative xmlns:adec="http://schemas.microsoft.com/office/drawing/2017/decorative" val="1"/>
+              </a:ext>
+            </a:extLst>
+          </p:cNvPr>
+          <p:cNvSpPr>
+            <a:spLocks noGrp="1" noRot="1" noChangeAspect="1" noMove="1" noResize="1" noEditPoints="1" noAdjustHandles="1" noChangeArrowheads="1" noChangeShapeType="1" noTextEdit="1"/>
+          </p:cNvSpPr>
+          <p:nvPr>
+            <p:extLst>
+              <p:ext uri="{386F3935-93C4-4BCD-93E2-E3B085C9AB24}">
+                <p16:designElem xmlns:p16="http://schemas.microsoft.com/office/powerpoint/2015/main" val="1"/>
+              </p:ext>
+            </p:extLst>
+          </p:nvPr>
+        </p:nvSpPr>
+        <p:spPr>
+          <a:xfrm>
+            <a:off x="477012" y="480060"/>
+            <a:ext cx="11237976" cy="5897880"/>
+          </a:xfrm>
+          <a:prstGeom prst="rect">
+            <a:avLst/>
+          </a:prstGeom>
+          <a:solidFill>
+            <a:schemeClr val="bg1"/>
+          </a:solidFill>
+          <a:ln>
+            <a:noFill/>
+          </a:ln>
+        </p:spPr>
+        <p:style>
+          <a:lnRef idx="2">
+            <a:schemeClr val="accent1">
+              <a:shade val="50000"/>
+            </a:schemeClr>
+          </a:lnRef>
+          <a:fillRef idx="1">
+            <a:schemeClr val="accent1"/>
+          </a:fillRef>
+          <a:effectRef idx="0">
+            <a:schemeClr val="accent1"/>
+          </a:effectRef>
+          <a:fontRef idx="minor">
+            <a:schemeClr val="lt1"/>
+          </a:fontRef>
+        </p:style>
+        <p:txBody>
+          <a:bodyPr rtlCol="0" anchor="ctr"/>
+          <a:lstStyle/>
+          <a:p>
+            <a:pPr algn="ctr"/>
+            <a:endParaRPr lang="en-US"/>
+          </a:p>
+        </p:txBody>
+      </p:sp>
+      <p:pic>
+        <p:nvPicPr>
+          <p:cNvPr id="3074" name="Picture 2" descr="Complex Flux">
+            <a:extLst>
+              <a:ext uri="{FF2B5EF4-FFF2-40B4-BE49-F238E27FC236}">
+                <a16:creationId xmlns:a16="http://schemas.microsoft.com/office/drawing/2014/main" id="{91C0E8A9-4A20-44EE-A9C9-BAD26B815D6E}"/>
+              </a:ext>
+            </a:extLst>
+          </p:cNvPr>
+          <p:cNvPicPr>
+            <a:picLocks noChangeAspect="1" noChangeArrowheads="1"/>
+          </p:cNvPicPr>
+          <p:nvPr/>
+        </p:nvPicPr>
+        <p:blipFill>
+          <a:blip r:embed="rId3">
+            <a:extLst>
+              <a:ext uri="{28A0092B-C50C-407E-A947-70E740481C1C}">
+                <a14:useLocalDpi xmlns:a14="http://schemas.microsoft.com/office/drawing/2010/main" val="0"/>
+              </a:ext>
+            </a:extLst>
+          </a:blip>
+          <a:srcRect/>
+          <a:stretch>
+            <a:fillRect/>
+          </a:stretch>
+        </p:blipFill>
+        <p:spPr bwMode="auto">
+          <a:xfrm>
+            <a:off x="3070938" y="800007"/>
+            <a:ext cx="6035768" cy="5251118"/>
+          </a:xfrm>
+          <a:prstGeom prst="rect">
+            <a:avLst/>
+          </a:prstGeom>
+          <a:noFill/>
+          <a:extLst>
+            <a:ext uri="{909E8E84-426E-40DD-AFC4-6F175D3DCCD1}">
+              <a14:hiddenFill xmlns:a14="http://schemas.microsoft.com/office/drawing/2010/main">
+                <a:solidFill>
+                  <a:srgbClr val="FFFFFF"/>
+                </a:solidFill>
+              </a14:hiddenFill>
+            </a:ext>
+          </a:extLst>
+        </p:spPr>
+      </p:pic>
+    </p:spTree>
+    <p:extLst>
+      <p:ext uri="{BB962C8B-B14F-4D97-AF65-F5344CB8AC3E}">
+        <p14:creationId xmlns:p14="http://schemas.microsoft.com/office/powerpoint/2010/main" val="1220554882"/>
+      </p:ext>
+    </p:extLst>
+  </p:cSld>
+  <p:clrMapOvr>
+    <a:overrideClrMapping bg1="lt1" tx1="dk1" bg2="lt2" tx2="dk2" accent1="accent1" accent2="accent2" accent3="accent3" accent4="accent4" accent5="accent5" accent6="accent6" hlink="hlink" folHlink="folHlink"/>
+  </p:clrMapOvr>
+</p:sld>
+</file>
+
+<file path=ppt/slides/slide6.xml><?xml version="1.0" encoding="utf-8"?>
+<p:sld xmlns:a="http://schemas.openxmlformats.org/drawingml/2006/main" xmlns:r="http://schemas.openxmlformats.org/officeDocument/2006/relationships" xmlns:p="http://schemas.openxmlformats.org/presentationml/2006/main">
+  <p:cSld>
+    <p:spTree>
+      <p:nvGrpSpPr>
+        <p:cNvPr id="1" name=""/>
+        <p:cNvGrpSpPr/>
+        <p:nvPr/>
+      </p:nvGrpSpPr>
+      <p:grpSpPr>
+        <a:xfrm>
+          <a:off x="0" y="0"/>
+          <a:ext cx="0" cy="0"/>
+          <a:chOff x="0" y="0"/>
+          <a:chExt cx="0" cy="0"/>
+        </a:xfrm>
+      </p:grpSpPr>
+      <p:sp>
+        <p:nvSpPr>
+          <p:cNvPr id="2" name="Title 1">
+            <a:extLst>
+              <a:ext uri="{FF2B5EF4-FFF2-40B4-BE49-F238E27FC236}">
+                <a16:creationId xmlns:a16="http://schemas.microsoft.com/office/drawing/2014/main" id="{98A26331-D570-4498-8BC1-12ACD4CA9FEB}"/>
+              </a:ext>
+            </a:extLst>
+          </p:cNvPr>
+          <p:cNvSpPr>
+            <a:spLocks noGrp="1"/>
+          </p:cNvSpPr>
+          <p:nvPr>
+            <p:ph type="title"/>
+          </p:nvPr>
+        </p:nvSpPr>
+        <p:spPr/>
+        <p:txBody>
+          <a:bodyPr/>
+          <a:lstStyle/>
+          <a:p>
+            <a:r>
+              <a:rPr lang="en-US" dirty="0"/>
+              <a:t>Why?</a:t>
+            </a:r>
+            <a:endParaRPr lang="en-ZA" dirty="0"/>
+          </a:p>
+        </p:txBody>
+      </p:sp>
+      <p:sp>
+        <p:nvSpPr>
+          <p:cNvPr id="3" name="Content Placeholder 2">
+            <a:extLst>
+              <a:ext uri="{FF2B5EF4-FFF2-40B4-BE49-F238E27FC236}">
+                <a16:creationId xmlns:a16="http://schemas.microsoft.com/office/drawing/2014/main" id="{C911AC07-D34E-4347-83C6-4C20131FA03A}"/>
+              </a:ext>
+            </a:extLst>
+          </p:cNvPr>
+          <p:cNvSpPr>
+            <a:spLocks noGrp="1"/>
+          </p:cNvSpPr>
+          <p:nvPr>
+            <p:ph idx="1"/>
+          </p:nvPr>
+        </p:nvSpPr>
+        <p:spPr/>
+        <p:txBody>
+          <a:bodyPr/>
+          <a:lstStyle/>
+          <a:p>
+            <a:r>
+              <a:rPr lang="en-US" dirty="0"/>
+              <a:t>Unidirectional data flow</a:t>
+            </a:r>
+          </a:p>
+          <a:p>
+            <a:r>
+              <a:rPr lang="en-US" dirty="0"/>
+              <a:t>Every change of state has only one easily trace-able, corresponding action</a:t>
+            </a:r>
+          </a:p>
+          <a:p>
+            <a:r>
+              <a:rPr lang="en-US" dirty="0"/>
+              <a:t>Action handlers are synchronous</a:t>
+            </a:r>
+          </a:p>
+          <a:p>
+            <a:r>
+              <a:rPr lang="en-US" dirty="0"/>
+              <a:t>Inversion of control</a:t>
+            </a:r>
+          </a:p>
+          <a:p>
+            <a:r>
+              <a:rPr lang="en-US" dirty="0"/>
+              <a:t>Action handlers are pure</a:t>
+            </a:r>
+          </a:p>
+          <a:p>
+            <a:r>
+              <a:rPr lang="en-US" dirty="0"/>
+              <a:t>Action handlers are easy to test, because they’re pure</a:t>
+            </a:r>
+            <a:endParaRPr lang="en-ZA" dirty="0"/>
+          </a:p>
+        </p:txBody>
+      </p:sp>
+    </p:spTree>
+    <p:extLst>
+      <p:ext uri="{BB962C8B-B14F-4D97-AF65-F5344CB8AC3E}">
+        <p14:creationId xmlns:p14="http://schemas.microsoft.com/office/powerpoint/2010/main" val="3594884600"/>
+      </p:ext>
+    </p:extLst>
+  </p:cSld>
+  <p:clrMapOvr>
+    <a:masterClrMapping/>
+  </p:clrMapOvr>
+  <p:timing>
+    <p:tnLst>
+      <p:par>
+        <p:cTn id="1" dur="indefinite" restart="never" nodeType="tmRoot">
+          <p:childTnLst>
+            <p:seq concurrent="1" nextAc="seek">
+              <p:cTn id="2" dur="indefinite" nodeType="mainSeq">
+                <p:childTnLst>
+                  <p:par>
+                    <p:cTn id="3" fill="hold">
+                      <p:stCondLst>
+                        <p:cond delay="indefinite"/>
+                      </p:stCondLst>
+                      <p:childTnLst>
+                        <p:par>
+                          <p:cTn id="4" fill="hold">
+                            <p:stCondLst>
+                              <p:cond delay="0"/>
+                            </p:stCondLst>
+                            <p:childTnLst>
+                              <p:par>
+                                <p:cTn id="5" presetID="1" presetClass="entr" presetSubtype="0" fill="hold" nodeType="clickEffect">
+                                  <p:stCondLst>
+                                    <p:cond delay="0"/>
+                                  </p:stCondLst>
+                                  <p:childTnLst>
+                                    <p:set>
+                                      <p:cBhvr>
+                                        <p:cTn id="6" dur="1" fill="hold">
+                                          <p:stCondLst>
+                                            <p:cond delay="0"/>
+                                          </p:stCondLst>
+                                        </p:cTn>
+                                        <p:tgtEl>
+                                          <p:spTgt spid="3">
+                                            <p:txEl>
+                                              <p:pRg st="0" end="0"/>
+                                            </p:txEl>
+                                          </p:spTgt>
+                                        </p:tgtEl>
+                                        <p:attrNameLst>
+                                          <p:attrName>style.visibility</p:attrName>
+                                        </p:attrNameLst>
+                                      </p:cBhvr>
+                                      <p:to>
+                                        <p:strVal val="visible"/>
+                                      </p:to>
+                                    </p:set>
+                                  </p:childTnLst>
+                                </p:cTn>
+                              </p:par>
+                            </p:childTnLst>
+                          </p:cTn>
+                        </p:par>
+                      </p:childTnLst>
+                    </p:cTn>
+                  </p:par>
+                  <p:par>
+                    <p:cTn id="7" fill="hold">
+                      <p:stCondLst>
+                        <p:cond delay="indefinite"/>
+                      </p:stCondLst>
+                      <p:childTnLst>
+                        <p:par>
+                          <p:cTn id="8" fill="hold">
+                            <p:stCondLst>
+                              <p:cond delay="0"/>
+                            </p:stCondLst>
+                            <p:childTnLst>
+                              <p:par>
+                                <p:cTn id="9" presetID="1" presetClass="entr" presetSubtype="0" fill="hold" nodeType="clickEffect">
+                                  <p:stCondLst>
+                                    <p:cond delay="0"/>
+                                  </p:stCondLst>
+                                  <p:childTnLst>
+                                    <p:set>
+                                      <p:cBhvr>
+                                        <p:cTn id="10" dur="1" fill="hold">
+                                          <p:stCondLst>
+                                            <p:cond delay="0"/>
+                                          </p:stCondLst>
+                                        </p:cTn>
+                                        <p:tgtEl>
+                                          <p:spTgt spid="3">
+                                            <p:txEl>
+                                              <p:pRg st="1" end="1"/>
+                                            </p:txEl>
+                                          </p:spTgt>
+                                        </p:tgtEl>
+                                        <p:attrNameLst>
+                                          <p:attrName>style.visibility</p:attrName>
+                                        </p:attrNameLst>
+                                      </p:cBhvr>
+                                      <p:to>
+                                        <p:strVal val="visible"/>
+                                      </p:to>
+                                    </p:set>
+                                  </p:childTnLst>
+                                </p:cTn>
+                              </p:par>
+                            </p:childTnLst>
+                          </p:cTn>
+                        </p:par>
+                      </p:childTnLst>
+                    </p:cTn>
+                  </p:par>
+                  <p:par>
+                    <p:cTn id="11" fill="hold">
+                      <p:stCondLst>
+                        <p:cond delay="indefinite"/>
+                      </p:stCondLst>
+                      <p:childTnLst>
+                        <p:par>
+                          <p:cTn id="12" fill="hold">
+                            <p:stCondLst>
+                              <p:cond delay="0"/>
+                            </p:stCondLst>
+                            <p:childTnLst>
+                              <p:par>
+                                <p:cTn id="13" presetID="1" presetClass="entr" presetSubtype="0" fill="hold" nodeType="clickEffect">
+                                  <p:stCondLst>
+                                    <p:cond delay="0"/>
+                                  </p:stCondLst>
+                                  <p:childTnLst>
+                                    <p:set>
+                                      <p:cBhvr>
+                                        <p:cTn id="14" dur="1" fill="hold">
+                                          <p:stCondLst>
+                                            <p:cond delay="0"/>
+                                          </p:stCondLst>
+                                        </p:cTn>
+                                        <p:tgtEl>
+                                          <p:spTgt spid="3">
+                                            <p:txEl>
+                                              <p:pRg st="2" end="2"/>
+                                            </p:txEl>
+                                          </p:spTgt>
+                                        </p:tgtEl>
+                                        <p:attrNameLst>
+                                          <p:attrName>style.visibility</p:attrName>
+                                        </p:attrNameLst>
+                                      </p:cBhvr>
+                                      <p:to>
+                                        <p:strVal val="visible"/>
+                                      </p:to>
+                                    </p:set>
+                                  </p:childTnLst>
+                                </p:cTn>
+                              </p:par>
+                            </p:childTnLst>
+                          </p:cTn>
+                        </p:par>
+                      </p:childTnLst>
+                    </p:cTn>
+                  </p:par>
+                  <p:par>
+                    <p:cTn id="15" fill="hold">
+                      <p:stCondLst>
+                        <p:cond delay="indefinite"/>
+                      </p:stCondLst>
+                      <p:childTnLst>
+                        <p:par>
+                          <p:cTn id="16" fill="hold">
+                            <p:stCondLst>
+                              <p:cond delay="0"/>
+                            </p:stCondLst>
+                            <p:childTnLst>
+                              <p:par>
+                                <p:cTn id="17" presetID="1" presetClass="entr" presetSubtype="0" fill="hold" nodeType="clickEffect">
+                                  <p:stCondLst>
+                                    <p:cond delay="0"/>
+                                  </p:stCondLst>
+                                  <p:childTnLst>
+                                    <p:set>
+                                      <p:cBhvr>
+                                        <p:cTn id="18" dur="1" fill="hold">
+                                          <p:stCondLst>
+                                            <p:cond delay="0"/>
+                                          </p:stCondLst>
+                                        </p:cTn>
+                                        <p:tgtEl>
+                                          <p:spTgt spid="3">
+                                            <p:txEl>
+                                              <p:pRg st="3" end="3"/>
+                                            </p:txEl>
+                                          </p:spTgt>
+                                        </p:tgtEl>
+                                        <p:attrNameLst>
+                                          <p:attrName>style.visibility</p:attrName>
+                                        </p:attrNameLst>
+                                      </p:cBhvr>
+                                      <p:to>
+                                        <p:strVal val="visible"/>
+                                      </p:to>
+                                    </p:set>
+                                  </p:childTnLst>
+                                </p:cTn>
+                              </p:par>
+                            </p:childTnLst>
+                          </p:cTn>
+                        </p:par>
+                      </p:childTnLst>
+                    </p:cTn>
+                  </p:par>
+                  <p:par>
+                    <p:cTn id="19" fill="hold">
+                      <p:stCondLst>
+                        <p:cond delay="indefinite"/>
+                      </p:stCondLst>
+                      <p:childTnLst>
+                        <p:par>
+                          <p:cTn id="20" fill="hold">
+                            <p:stCondLst>
+                              <p:cond delay="0"/>
+                            </p:stCondLst>
+                            <p:childTnLst>
+                              <p:par>
+                                <p:cTn id="21" presetID="1" presetClass="entr" presetSubtype="0" fill="hold" nodeType="clickEffect">
+                                  <p:stCondLst>
+                                    <p:cond delay="0"/>
+                                  </p:stCondLst>
+                                  <p:childTnLst>
+                                    <p:set>
+                                      <p:cBhvr>
+                                        <p:cTn id="22" dur="1" fill="hold">
+                                          <p:stCondLst>
+                                            <p:cond delay="0"/>
+                                          </p:stCondLst>
+                                        </p:cTn>
+                                        <p:tgtEl>
+                                          <p:spTgt spid="3">
+                                            <p:txEl>
+                                              <p:pRg st="4" end="4"/>
+                                            </p:txEl>
+                                          </p:spTgt>
+                                        </p:tgtEl>
+                                        <p:attrNameLst>
+                                          <p:attrName>style.visibility</p:attrName>
+                                        </p:attrNameLst>
+                                      </p:cBhvr>
+                                      <p:to>
+                                        <p:strVal val="visible"/>
+                                      </p:to>
+                                    </p:set>
+                                  </p:childTnLst>
+                                </p:cTn>
+                              </p:par>
+                            </p:childTnLst>
+                          </p:cTn>
+                        </p:par>
+                      </p:childTnLst>
+                    </p:cTn>
+                  </p:par>
+                  <p:par>
+                    <p:cTn id="23" fill="hold">
+                      <p:stCondLst>
+                        <p:cond delay="indefinite"/>
+                      </p:stCondLst>
+                      <p:childTnLst>
+                        <p:par>
+                          <p:cTn id="24" fill="hold">
+                            <p:stCondLst>
+                              <p:cond delay="0"/>
+                            </p:stCondLst>
+                            <p:childTnLst>
+                              <p:par>
+                                <p:cTn id="25" presetID="1" presetClass="entr" presetSubtype="0" fill="hold" nodeType="clickEffect">
+                                  <p:stCondLst>
+                                    <p:cond delay="0"/>
+                                  </p:stCondLst>
+                                  <p:childTnLst>
+                                    <p:set>
+                                      <p:cBhvr>
+                                        <p:cTn id="26" dur="1" fill="hold">
+                                          <p:stCondLst>
+                                            <p:cond delay="0"/>
+                                          </p:stCondLst>
+                                        </p:cTn>
+                                        <p:tgtEl>
+                                          <p:spTgt spid="3">
+                                            <p:txEl>
+                                              <p:pRg st="5" end="5"/>
+                                            </p:txEl>
+                                          </p:spTgt>
+                                        </p:tgtEl>
+                                        <p:attrNameLst>
+                                          <p:attrName>style.visibility</p:attrName>
+                                        </p:attrNameLst>
+                                      </p:cBhvr>
+                                      <p:to>
+                                        <p:strVal val="visible"/>
+                                      </p:to>
+                                    </p:set>
+                                  </p:childTnLst>
+                                </p:cTn>
+                              </p:par>
+                            </p:childTnLst>
+                          </p:cTn>
+                        </p:par>
+                      </p:childTnLst>
+                    </p:cTn>
+                  </p:par>
+                </p:childTnLst>
+              </p:cTn>
+              <p:prevCondLst>
+                <p:cond evt="onPrev" delay="0">
+                  <p:tgtEl>
+                    <p:sldTgt/>
+                  </p:tgtEl>
+                </p:cond>
+              </p:prevCondLst>
+              <p:nextCondLst>
+                <p:cond evt="onNext" delay="0">
+                  <p:tgtEl>
+                    <p:sldTgt/>
+                  </p:tgtEl>
+                </p:cond>
+              </p:nextCondLst>
+            </p:seq>
+          </p:childTnLst>
+        </p:cTn>
+      </p:par>
+    </p:tnLst>
+  </p:timing>
+</p:sld>
+</file>
+
 <file path=ppt/theme/theme1.xml><?xml version="1.0" encoding="utf-8"?>
 <a:theme xmlns:a="http://schemas.openxmlformats.org/drawingml/2006/main" name="Celestial">
   <a:themeElements>

</xml_diff>

<commit_message>
fix days in month being 1 off, fix new todo button not showing for current day
</commit_message>
<xml_diff>
--- a/Redux/Another Redux Talk.pptx
+++ b/Redux/Another Redux Talk.pptx
@@ -11,6 +11,10 @@
     <p:sldId id="259" r:id="rId5"/>
     <p:sldId id="260" r:id="rId6"/>
     <p:sldId id="261" r:id="rId7"/>
+    <p:sldId id="266" r:id="rId8"/>
+    <p:sldId id="265" r:id="rId9"/>
+    <p:sldId id="264" r:id="rId10"/>
+    <p:sldId id="262" r:id="rId11"/>
   </p:sldIdLst>
   <p:sldSz cx="12192000" cy="6858000"/>
   <p:notesSz cx="6858000" cy="9144000"/>
@@ -347,7 +351,7 @@
             <a:fld id="{B61BEF0D-F0BB-DE4B-95CE-6DB70DBA9567}" type="datetimeFigureOut">
               <a:rPr lang="en-US" dirty="0"/>
               <a:pPr/>
-              <a:t>5/20/2018</a:t>
+              <a:t>5/23/2018</a:t>
             </a:fld>
             <a:endParaRPr lang="en-US" dirty="0"/>
           </a:p>
@@ -678,7 +682,7 @@
             <a:fld id="{B61BEF0D-F0BB-DE4B-95CE-6DB70DBA9567}" type="datetimeFigureOut">
               <a:rPr lang="en-US" dirty="0"/>
               <a:pPr/>
-              <a:t>5/20/2018</a:t>
+              <a:t>5/23/2018</a:t>
             </a:fld>
             <a:endParaRPr lang="en-US" dirty="0"/>
           </a:p>
@@ -953,7 +957,7 @@
             <a:fld id="{B61BEF0D-F0BB-DE4B-95CE-6DB70DBA9567}" type="datetimeFigureOut">
               <a:rPr lang="en-US" dirty="0"/>
               <a:pPr/>
-              <a:t>5/20/2018</a:t>
+              <a:t>5/23/2018</a:t>
             </a:fld>
             <a:endParaRPr lang="en-US" dirty="0"/>
           </a:p>
@@ -1518,7 +1522,7 @@
             <a:fld id="{B61BEF0D-F0BB-DE4B-95CE-6DB70DBA9567}" type="datetimeFigureOut">
               <a:rPr lang="en-US" dirty="0"/>
               <a:pPr/>
-              <a:t>5/20/2018</a:t>
+              <a:t>5/23/2018</a:t>
             </a:fld>
             <a:endParaRPr lang="en-US" dirty="0"/>
           </a:p>
@@ -1793,7 +1797,7 @@
             <a:fld id="{B61BEF0D-F0BB-DE4B-95CE-6DB70DBA9567}" type="datetimeFigureOut">
               <a:rPr lang="en-US" dirty="0"/>
               <a:pPr/>
-              <a:t>5/20/2018</a:t>
+              <a:t>5/23/2018</a:t>
             </a:fld>
             <a:endParaRPr lang="en-US" dirty="0"/>
           </a:p>
@@ -2352,7 +2356,7 @@
             <a:fld id="{B61BEF0D-F0BB-DE4B-95CE-6DB70DBA9567}" type="datetimeFigureOut">
               <a:rPr lang="en-US" dirty="0"/>
               <a:pPr/>
-              <a:t>5/20/2018</a:t>
+              <a:t>5/23/2018</a:t>
             </a:fld>
             <a:endParaRPr lang="en-US" dirty="0"/>
           </a:p>
@@ -2676,7 +2680,7 @@
             <a:fld id="{B61BEF0D-F0BB-DE4B-95CE-6DB70DBA9567}" type="datetimeFigureOut">
               <a:rPr lang="en-US" dirty="0"/>
               <a:pPr/>
-              <a:t>5/20/2018</a:t>
+              <a:t>5/23/2018</a:t>
             </a:fld>
             <a:endParaRPr lang="en-US" dirty="0"/>
           </a:p>
@@ -2878,7 +2882,7 @@
             <a:fld id="{B61BEF0D-F0BB-DE4B-95CE-6DB70DBA9567}" type="datetimeFigureOut">
               <a:rPr lang="en-US" dirty="0"/>
               <a:pPr/>
-              <a:t>5/20/2018</a:t>
+              <a:t>5/23/2018</a:t>
             </a:fld>
             <a:endParaRPr lang="en-US" dirty="0"/>
           </a:p>
@@ -3085,7 +3089,7 @@
             <a:fld id="{B61BEF0D-F0BB-DE4B-95CE-6DB70DBA9567}" type="datetimeFigureOut">
               <a:rPr lang="en-US" dirty="0"/>
               <a:pPr/>
-              <a:t>5/20/2018</a:t>
+              <a:t>5/23/2018</a:t>
             </a:fld>
             <a:endParaRPr lang="en-US" dirty="0"/>
           </a:p>
@@ -3285,7 +3289,7 @@
             <a:fld id="{B61BEF0D-F0BB-DE4B-95CE-6DB70DBA9567}" type="datetimeFigureOut">
               <a:rPr lang="en-US" dirty="0"/>
               <a:pPr/>
-              <a:t>5/20/2018</a:t>
+              <a:t>5/23/2018</a:t>
             </a:fld>
             <a:endParaRPr lang="en-US" dirty="0"/>
           </a:p>
@@ -3558,7 +3562,7 @@
             <a:fld id="{B61BEF0D-F0BB-DE4B-95CE-6DB70DBA9567}" type="datetimeFigureOut">
               <a:rPr lang="en-US" dirty="0"/>
               <a:pPr/>
-              <a:t>5/20/2018</a:t>
+              <a:t>5/23/2018</a:t>
             </a:fld>
             <a:endParaRPr lang="en-US" dirty="0"/>
           </a:p>
@@ -3821,7 +3825,7 @@
             <a:fld id="{B61BEF0D-F0BB-DE4B-95CE-6DB70DBA9567}" type="datetimeFigureOut">
               <a:rPr lang="en-US" dirty="0"/>
               <a:pPr/>
-              <a:t>5/20/2018</a:t>
+              <a:t>5/23/2018</a:t>
             </a:fld>
             <a:endParaRPr lang="en-US" dirty="0"/>
           </a:p>
@@ -4192,7 +4196,7 @@
             <a:fld id="{B61BEF0D-F0BB-DE4B-95CE-6DB70DBA9567}" type="datetimeFigureOut">
               <a:rPr lang="en-US" dirty="0"/>
               <a:pPr/>
-              <a:t>5/20/2018</a:t>
+              <a:t>5/23/2018</a:t>
             </a:fld>
             <a:endParaRPr lang="en-US" dirty="0"/>
           </a:p>
@@ -4337,7 +4341,7 @@
             <a:fld id="{B61BEF0D-F0BB-DE4B-95CE-6DB70DBA9567}" type="datetimeFigureOut">
               <a:rPr lang="en-US" dirty="0"/>
               <a:pPr/>
-              <a:t>5/20/2018</a:t>
+              <a:t>5/23/2018</a:t>
             </a:fld>
             <a:endParaRPr lang="en-US" dirty="0"/>
           </a:p>
@@ -4459,7 +4463,7 @@
             <a:fld id="{B61BEF0D-F0BB-DE4B-95CE-6DB70DBA9567}" type="datetimeFigureOut">
               <a:rPr lang="en-US" dirty="0"/>
               <a:pPr/>
-              <a:t>5/20/2018</a:t>
+              <a:t>5/23/2018</a:t>
             </a:fld>
             <a:endParaRPr lang="en-US" dirty="0"/>
           </a:p>
@@ -4741,7 +4745,7 @@
             <a:fld id="{B61BEF0D-F0BB-DE4B-95CE-6DB70DBA9567}" type="datetimeFigureOut">
               <a:rPr lang="en-US" dirty="0"/>
               <a:pPr/>
-              <a:t>5/20/2018</a:t>
+              <a:t>5/23/2018</a:t>
             </a:fld>
             <a:endParaRPr lang="en-US" dirty="0"/>
           </a:p>
@@ -5062,7 +5066,7 @@
             <a:fld id="{B61BEF0D-F0BB-DE4B-95CE-6DB70DBA9567}" type="datetimeFigureOut">
               <a:rPr lang="en-US" dirty="0"/>
               <a:pPr/>
-              <a:t>5/20/2018</a:t>
+              <a:t>5/23/2018</a:t>
             </a:fld>
             <a:endParaRPr lang="en-US" dirty="0"/>
           </a:p>
@@ -5273,7 +5277,7 @@
             <a:fld id="{B61BEF0D-F0BB-DE4B-95CE-6DB70DBA9567}" type="datetimeFigureOut">
               <a:rPr lang="en-US" dirty="0"/>
               <a:pPr/>
-              <a:t>5/20/2018</a:t>
+              <a:t>5/23/2018</a:t>
             </a:fld>
             <a:endParaRPr lang="en-US" dirty="0"/>
           </a:p>
@@ -5863,6 +5867,106 @@
 </p:sld>
 </file>
 
+<file path=ppt/slides/slide10.xml><?xml version="1.0" encoding="utf-8"?>
+<p:sld xmlns:a="http://schemas.openxmlformats.org/drawingml/2006/main" xmlns:r="http://schemas.openxmlformats.org/officeDocument/2006/relationships" xmlns:p="http://schemas.openxmlformats.org/presentationml/2006/main">
+  <p:cSld>
+    <p:spTree>
+      <p:nvGrpSpPr>
+        <p:cNvPr id="1" name=""/>
+        <p:cNvGrpSpPr/>
+        <p:nvPr/>
+      </p:nvGrpSpPr>
+      <p:grpSpPr>
+        <a:xfrm>
+          <a:off x="0" y="0"/>
+          <a:ext cx="0" cy="0"/>
+          <a:chOff x="0" y="0"/>
+          <a:chExt cx="0" cy="0"/>
+        </a:xfrm>
+      </p:grpSpPr>
+      <p:sp>
+        <p:nvSpPr>
+          <p:cNvPr id="2" name="Title 1">
+            <a:extLst>
+              <a:ext uri="{FF2B5EF4-FFF2-40B4-BE49-F238E27FC236}">
+                <a16:creationId xmlns:a16="http://schemas.microsoft.com/office/drawing/2014/main" id="{8CFD8970-7280-4220-8158-D0EF00C7D878}"/>
+              </a:ext>
+            </a:extLst>
+          </p:cNvPr>
+          <p:cNvSpPr>
+            <a:spLocks noGrp="1"/>
+          </p:cNvSpPr>
+          <p:nvPr>
+            <p:ph type="title"/>
+          </p:nvPr>
+        </p:nvSpPr>
+        <p:spPr/>
+        <p:txBody>
+          <a:bodyPr/>
+          <a:lstStyle/>
+          <a:p>
+            <a:r>
+              <a:rPr lang="en-US" dirty="0"/>
+              <a:t>Best practices</a:t>
+            </a:r>
+            <a:endParaRPr lang="en-ZA" dirty="0"/>
+          </a:p>
+        </p:txBody>
+      </p:sp>
+      <p:sp>
+        <p:nvSpPr>
+          <p:cNvPr id="3" name="Content Placeholder 2">
+            <a:extLst>
+              <a:ext uri="{FF2B5EF4-FFF2-40B4-BE49-F238E27FC236}">
+                <a16:creationId xmlns:a16="http://schemas.microsoft.com/office/drawing/2014/main" id="{B5642B40-84CB-467D-BC57-D2D4BF41B229}"/>
+              </a:ext>
+            </a:extLst>
+          </p:cNvPr>
+          <p:cNvSpPr>
+            <a:spLocks noGrp="1"/>
+          </p:cNvSpPr>
+          <p:nvPr>
+            <p:ph idx="1"/>
+          </p:nvPr>
+        </p:nvSpPr>
+        <p:spPr/>
+        <p:txBody>
+          <a:bodyPr/>
+          <a:lstStyle/>
+          <a:p>
+            <a:r>
+              <a:rPr lang="en-US" dirty="0"/>
+              <a:t>Reducers must always be pure</a:t>
+            </a:r>
+          </a:p>
+          <a:p>
+            <a:r>
+              <a:rPr lang="en-US" dirty="0"/>
+              <a:t>Use reducer composition</a:t>
+            </a:r>
+          </a:p>
+          <a:p>
+            <a:r>
+              <a:rPr lang="en-US" dirty="0"/>
+              <a:t>Name each action constant as &lt;NOUN&gt;_&lt;VERB&gt;</a:t>
+            </a:r>
+            <a:endParaRPr lang="en-ZA" dirty="0"/>
+          </a:p>
+        </p:txBody>
+      </p:sp>
+    </p:spTree>
+    <p:extLst>
+      <p:ext uri="{BB962C8B-B14F-4D97-AF65-F5344CB8AC3E}">
+        <p14:creationId xmlns:p14="http://schemas.microsoft.com/office/powerpoint/2010/main" val="3435539742"/>
+      </p:ext>
+    </p:extLst>
+  </p:cSld>
+  <p:clrMapOvr>
+    <a:masterClrMapping/>
+  </p:clrMapOvr>
+</p:sld>
+</file>
+
 <file path=ppt/slides/slide2.xml><?xml version="1.0" encoding="utf-8"?>
 <p:sld xmlns:a="http://schemas.openxmlformats.org/drawingml/2006/main" xmlns:r="http://schemas.openxmlformats.org/officeDocument/2006/relationships" xmlns:p="http://schemas.openxmlformats.org/presentationml/2006/main">
   <p:cSld>
@@ -6950,6 +7054,17 @@
               <a:rPr lang="en-US" dirty="0"/>
               <a:t>Action handlers are easy to test, because they’re pure</a:t>
             </a:r>
+          </a:p>
+          <a:p>
+            <a:r>
+              <a:rPr lang="en-US" dirty="0"/>
+              <a:t>On your website you can test state modifications without seeing state as a reflection of your DOM.</a:t>
+            </a:r>
+          </a:p>
+          <a:p>
+            <a:pPr marL="0" indent="0">
+              <a:buNone/>
+            </a:pPr>
             <a:endParaRPr lang="en-ZA" dirty="0"/>
           </a:p>
         </p:txBody>
@@ -7266,6 +7381,55 @@
                       </p:childTnLst>
                     </p:cTn>
                   </p:par>
+                  <p:par>
+                    <p:cTn id="27" fill="hold">
+                      <p:stCondLst>
+                        <p:cond delay="indefinite"/>
+                      </p:stCondLst>
+                      <p:childTnLst>
+                        <p:par>
+                          <p:cTn id="28" fill="hold">
+                            <p:stCondLst>
+                              <p:cond delay="0"/>
+                            </p:stCondLst>
+                            <p:childTnLst>
+                              <p:par>
+                                <p:cTn id="29" presetID="1" presetClass="entr" presetSubtype="0" fill="hold" nodeType="clickEffect">
+                                  <p:stCondLst>
+                                    <p:cond delay="0"/>
+                                  </p:stCondLst>
+                                  <p:childTnLst>
+                                    <p:set>
+                                      <p:cBhvr>
+                                        <p:cTn id="30" dur="1" fill="hold">
+                                          <p:stCondLst>
+                                            <p:cond delay="0"/>
+                                          </p:stCondLst>
+                                        </p:cTn>
+                                        <p:tgtEl>
+                                          <p:spTgt spid="3">
+                                            <p:txEl>
+                                              <p:pRg st="6" end="6"/>
+                                            </p:txEl>
+                                          </p:spTgt>
+                                        </p:tgtEl>
+                                        <p:attrNameLst>
+                                          <p:attrName>style.visibility</p:attrName>
+                                        </p:attrNameLst>
+                                      </p:cBhvr>
+                                      <p:to>
+                                        <p:strVal val="visible"/>
+                                      </p:to>
+                                    </p:set>
+                                  </p:childTnLst>
+                                </p:cTn>
+                              </p:par>
+                            </p:childTnLst>
+                          </p:cTn>
+                        </p:par>
+                      </p:childTnLst>
+                    </p:cTn>
+                  </p:par>
                 </p:childTnLst>
               </p:cTn>
               <p:prevCondLst>
@@ -7288,6 +7452,563 @@
       </p:par>
     </p:tnLst>
   </p:timing>
+</p:sld>
+</file>
+
+<file path=ppt/slides/slide7.xml><?xml version="1.0" encoding="utf-8"?>
+<p:sld xmlns:a="http://schemas.openxmlformats.org/drawingml/2006/main" xmlns:r="http://schemas.openxmlformats.org/officeDocument/2006/relationships" xmlns:p="http://schemas.openxmlformats.org/presentationml/2006/main">
+  <p:cSld>
+    <p:bg>
+      <p:bgPr>
+        <a:blipFill>
+          <a:blip r:embed="rId2">
+            <a:extLst/>
+          </a:blip>
+          <a:stretch/>
+        </a:blipFill>
+        <a:effectLst/>
+      </p:bgPr>
+    </p:bg>
+    <p:spTree>
+      <p:nvGrpSpPr>
+        <p:cNvPr id="1" name=""/>
+        <p:cNvGrpSpPr/>
+        <p:nvPr/>
+      </p:nvGrpSpPr>
+      <p:grpSpPr>
+        <a:xfrm>
+          <a:off x="0" y="0"/>
+          <a:ext cx="0" cy="0"/>
+          <a:chOff x="0" y="0"/>
+          <a:chExt cx="0" cy="0"/>
+        </a:xfrm>
+      </p:grpSpPr>
+      <p:pic>
+        <p:nvPicPr>
+          <p:cNvPr id="16" name="Picture 9">
+            <a:extLst>
+              <a:ext uri="{FF2B5EF4-FFF2-40B4-BE49-F238E27FC236}">
+                <a16:creationId xmlns:a16="http://schemas.microsoft.com/office/drawing/2014/main" id="{9F6D95BA-5DEA-4969-83AE-052DB82DC8AB}"/>
+              </a:ext>
+              <a:ext uri="{C183D7F6-B498-43B3-948B-1728B52AA6E4}">
+                <adec:decorative xmlns:adec="http://schemas.microsoft.com/office/drawing/2017/decorative" val="1"/>
+              </a:ext>
+            </a:extLst>
+          </p:cNvPr>
+          <p:cNvPicPr>
+            <a:picLocks noGrp="1" noRot="1" noChangeAspect="1" noMove="1" noResize="1" noEditPoints="1" noAdjustHandles="1" noChangeArrowheads="1" noChangeShapeType="1" noCrop="1"/>
+          </p:cNvPicPr>
+          <p:nvPr>
+            <p:extLst>
+              <p:ext uri="{386F3935-93C4-4BCD-93E2-E3B085C9AB24}">
+                <p16:designElem xmlns:p16="http://schemas.microsoft.com/office/powerpoint/2015/main" val="1"/>
+              </p:ext>
+            </p:extLst>
+          </p:nvPr>
+        </p:nvPicPr>
+        <p:blipFill>
+          <a:blip r:embed="rId3">
+            <a:extLst>
+              <a:ext uri="{28A0092B-C50C-407E-A947-70E740481C1C}">
+                <a14:useLocalDpi xmlns:a14="http://schemas.microsoft.com/office/drawing/2010/main" val="0"/>
+              </a:ext>
+            </a:extLst>
+          </a:blip>
+          <a:stretch>
+            <a:fillRect/>
+          </a:stretch>
+        </p:blipFill>
+        <p:spPr>
+          <a:xfrm>
+            <a:off x="0" y="0"/>
+            <a:ext cx="12188825" cy="6856214"/>
+          </a:xfrm>
+          <a:prstGeom prst="rect">
+            <a:avLst/>
+          </a:prstGeom>
+        </p:spPr>
+      </p:pic>
+      <p:pic>
+        <p:nvPicPr>
+          <p:cNvPr id="17" name="Picture 11">
+            <a:extLst>
+              <a:ext uri="{FF2B5EF4-FFF2-40B4-BE49-F238E27FC236}">
+                <a16:creationId xmlns:a16="http://schemas.microsoft.com/office/drawing/2014/main" id="{D1CEED38-66FC-4D91-86AF-A99BDCEF96AB}"/>
+              </a:ext>
+              <a:ext uri="{C183D7F6-B498-43B3-948B-1728B52AA6E4}">
+                <adec:decorative xmlns:adec="http://schemas.microsoft.com/office/drawing/2017/decorative" val="1"/>
+              </a:ext>
+            </a:extLst>
+          </p:cNvPr>
+          <p:cNvPicPr>
+            <a:picLocks noGrp="1" noRot="1" noChangeAspect="1" noMove="1" noResize="1" noEditPoints="1" noAdjustHandles="1" noChangeArrowheads="1" noChangeShapeType="1" noCrop="1"/>
+          </p:cNvPicPr>
+          <p:nvPr>
+            <p:extLst>
+              <p:ext uri="{386F3935-93C4-4BCD-93E2-E3B085C9AB24}">
+                <p16:designElem xmlns:p16="http://schemas.microsoft.com/office/powerpoint/2015/main" val="1"/>
+              </p:ext>
+            </p:extLst>
+          </p:nvPr>
+        </p:nvPicPr>
+        <p:blipFill>
+          <a:blip r:embed="rId4">
+            <a:extLst>
+              <a:ext uri="{28A0092B-C50C-407E-A947-70E740481C1C}">
+                <a14:useLocalDpi xmlns:a14="http://schemas.microsoft.com/office/drawing/2010/main" val="0"/>
+              </a:ext>
+            </a:extLst>
+          </a:blip>
+          <a:stretch>
+            <a:fillRect/>
+          </a:stretch>
+        </p:blipFill>
+        <p:spPr>
+          <a:xfrm>
+            <a:off x="0" y="0"/>
+            <a:ext cx="12188825" cy="6856214"/>
+          </a:xfrm>
+          <a:prstGeom prst="rect">
+            <a:avLst/>
+          </a:prstGeom>
+        </p:spPr>
+      </p:pic>
+      <p:sp>
+        <p:nvSpPr>
+          <p:cNvPr id="2" name="Title 1">
+            <a:extLst>
+              <a:ext uri="{FF2B5EF4-FFF2-40B4-BE49-F238E27FC236}">
+                <a16:creationId xmlns:a16="http://schemas.microsoft.com/office/drawing/2014/main" id="{08C2D0EB-02F3-41E9-9565-3D0B0DC44748}"/>
+              </a:ext>
+            </a:extLst>
+          </p:cNvPr>
+          <p:cNvSpPr>
+            <a:spLocks noGrp="1"/>
+          </p:cNvSpPr>
+          <p:nvPr>
+            <p:ph type="title"/>
+          </p:nvPr>
+        </p:nvSpPr>
+        <p:spPr>
+          <a:xfrm>
+            <a:off x="7905135" y="1964267"/>
+            <a:ext cx="3254990" cy="2421464"/>
+          </a:xfrm>
+        </p:spPr>
+        <p:txBody>
+          <a:bodyPr vert="horz" lIns="91440" tIns="45720" rIns="91440" bIns="45720" rtlCol="0" anchor="b">
+            <a:normAutofit/>
+          </a:bodyPr>
+          <a:lstStyle/>
+          <a:p>
+            <a:pPr algn="r"/>
+            <a:r>
+              <a:rPr lang="en-US" sz="4800" cap="all"/>
+              <a:t>WRAP YOUR APP!</a:t>
+            </a:r>
+          </a:p>
+        </p:txBody>
+      </p:sp>
+      <p:pic>
+        <p:nvPicPr>
+          <p:cNvPr id="6" name="Picture 5">
+            <a:extLst>
+              <a:ext uri="{FF2B5EF4-FFF2-40B4-BE49-F238E27FC236}">
+                <a16:creationId xmlns:a16="http://schemas.microsoft.com/office/drawing/2014/main" id="{ACDB8242-A67D-4E55-9CB5-8BF71262FF4B}"/>
+              </a:ext>
+            </a:extLst>
+          </p:cNvPr>
+          <p:cNvPicPr>
+            <a:picLocks noChangeAspect="1"/>
+          </p:cNvPicPr>
+          <p:nvPr/>
+        </p:nvPicPr>
+        <p:blipFill>
+          <a:blip r:embed="rId5"/>
+          <a:stretch>
+            <a:fillRect/>
+          </a:stretch>
+        </p:blipFill>
+        <p:spPr>
+          <a:xfrm>
+            <a:off x="1424962" y="2156706"/>
+            <a:ext cx="6191250" cy="2962275"/>
+          </a:xfrm>
+          <a:prstGeom prst="rect">
+            <a:avLst/>
+          </a:prstGeom>
+        </p:spPr>
+      </p:pic>
+    </p:spTree>
+    <p:extLst>
+      <p:ext uri="{BB962C8B-B14F-4D97-AF65-F5344CB8AC3E}">
+        <p14:creationId xmlns:p14="http://schemas.microsoft.com/office/powerpoint/2010/main" val="4226048860"/>
+      </p:ext>
+    </p:extLst>
+  </p:cSld>
+  <p:clrMapOvr>
+    <a:masterClrMapping/>
+  </p:clrMapOvr>
+</p:sld>
+</file>
+
+<file path=ppt/slides/slide8.xml><?xml version="1.0" encoding="utf-8"?>
+<p:sld xmlns:a="http://schemas.openxmlformats.org/drawingml/2006/main" xmlns:r="http://schemas.openxmlformats.org/officeDocument/2006/relationships" xmlns:p="http://schemas.openxmlformats.org/presentationml/2006/main">
+  <p:cSld>
+    <p:bg>
+      <p:bgPr>
+        <a:blipFill>
+          <a:blip r:embed="rId2">
+            <a:extLst/>
+          </a:blip>
+          <a:stretch/>
+        </a:blipFill>
+        <a:effectLst/>
+      </p:bgPr>
+    </p:bg>
+    <p:spTree>
+      <p:nvGrpSpPr>
+        <p:cNvPr id="1" name=""/>
+        <p:cNvGrpSpPr/>
+        <p:nvPr/>
+      </p:nvGrpSpPr>
+      <p:grpSpPr>
+        <a:xfrm>
+          <a:off x="0" y="0"/>
+          <a:ext cx="0" cy="0"/>
+          <a:chOff x="0" y="0"/>
+          <a:chExt cx="0" cy="0"/>
+        </a:xfrm>
+      </p:grpSpPr>
+      <p:pic>
+        <p:nvPicPr>
+          <p:cNvPr id="102" name="Picture 99">
+            <a:extLst>
+              <a:ext uri="{FF2B5EF4-FFF2-40B4-BE49-F238E27FC236}">
+                <a16:creationId xmlns:a16="http://schemas.microsoft.com/office/drawing/2014/main" id="{4432DA31-8308-4F44-87C4-068169AA4DCA}"/>
+              </a:ext>
+              <a:ext uri="{C183D7F6-B498-43B3-948B-1728B52AA6E4}">
+                <adec:decorative xmlns:adec="http://schemas.microsoft.com/office/drawing/2017/decorative" val="1"/>
+              </a:ext>
+            </a:extLst>
+          </p:cNvPr>
+          <p:cNvPicPr>
+            <a:picLocks noGrp="1" noRot="1" noChangeAspect="1" noMove="1" noResize="1" noEditPoints="1" noAdjustHandles="1" noChangeArrowheads="1" noChangeShapeType="1" noCrop="1"/>
+          </p:cNvPicPr>
+          <p:nvPr>
+            <p:extLst>
+              <p:ext uri="{386F3935-93C4-4BCD-93E2-E3B085C9AB24}">
+                <p16:designElem xmlns:p16="http://schemas.microsoft.com/office/powerpoint/2015/main" val="1"/>
+              </p:ext>
+            </p:extLst>
+          </p:nvPr>
+        </p:nvPicPr>
+        <p:blipFill>
+          <a:blip r:embed="rId3">
+            <a:extLst>
+              <a:ext uri="{28A0092B-C50C-407E-A947-70E740481C1C}">
+                <a14:useLocalDpi xmlns:a14="http://schemas.microsoft.com/office/drawing/2010/main" val="0"/>
+              </a:ext>
+            </a:extLst>
+          </a:blip>
+          <a:stretch>
+            <a:fillRect/>
+          </a:stretch>
+        </p:blipFill>
+        <p:spPr>
+          <a:xfrm>
+            <a:off x="0" y="0"/>
+            <a:ext cx="12188825" cy="6856214"/>
+          </a:xfrm>
+          <a:prstGeom prst="rect">
+            <a:avLst/>
+          </a:prstGeom>
+        </p:spPr>
+      </p:pic>
+      <p:pic>
+        <p:nvPicPr>
+          <p:cNvPr id="6" name="Picture 5">
+            <a:extLst>
+              <a:ext uri="{FF2B5EF4-FFF2-40B4-BE49-F238E27FC236}">
+                <a16:creationId xmlns:a16="http://schemas.microsoft.com/office/drawing/2014/main" id="{40A4DE4C-8612-4E0E-931C-06D495F41C7D}"/>
+              </a:ext>
+            </a:extLst>
+          </p:cNvPr>
+          <p:cNvPicPr>
+            <a:picLocks noChangeAspect="1"/>
+          </p:cNvPicPr>
+          <p:nvPr/>
+        </p:nvPicPr>
+        <p:blipFill>
+          <a:blip r:embed="rId4"/>
+          <a:stretch>
+            <a:fillRect/>
+          </a:stretch>
+        </p:blipFill>
+        <p:spPr>
+          <a:xfrm>
+            <a:off x="643464" y="956124"/>
+            <a:ext cx="10909440" cy="2978751"/>
+          </a:xfrm>
+          <a:prstGeom prst="roundRect">
+            <a:avLst>
+              <a:gd name="adj" fmla="val 4380"/>
+            </a:avLst>
+          </a:prstGeom>
+          <a:ln w="50800" cap="sq" cmpd="dbl">
+            <a:gradFill flip="none" rotWithShape="1">
+              <a:gsLst>
+                <a:gs pos="0">
+                  <a:srgbClr val="FFFFFF"/>
+                </a:gs>
+                <a:gs pos="100000">
+                  <a:schemeClr val="tx1">
+                    <a:alpha val="0"/>
+                  </a:schemeClr>
+                </a:gs>
+              </a:gsLst>
+              <a:path path="circle">
+                <a:fillToRect l="50000" t="50000" r="50000" b="50000"/>
+              </a:path>
+              <a:tileRect/>
+            </a:gradFill>
+            <a:miter lim="800000"/>
+          </a:ln>
+          <a:effectLst>
+            <a:outerShdw blurRad="254000" algn="tl" rotWithShape="0">
+              <a:srgbClr val="000000">
+                <a:alpha val="43000"/>
+              </a:srgbClr>
+            </a:outerShdw>
+          </a:effectLst>
+        </p:spPr>
+      </p:pic>
+      <p:sp>
+        <p:nvSpPr>
+          <p:cNvPr id="2" name="Title 1">
+            <a:extLst>
+              <a:ext uri="{FF2B5EF4-FFF2-40B4-BE49-F238E27FC236}">
+                <a16:creationId xmlns:a16="http://schemas.microsoft.com/office/drawing/2014/main" id="{DAAC4BBB-17CA-4F7B-8663-0B7A62762AB9}"/>
+              </a:ext>
+            </a:extLst>
+          </p:cNvPr>
+          <p:cNvSpPr>
+            <a:spLocks noGrp="1"/>
+          </p:cNvSpPr>
+          <p:nvPr>
+            <p:ph type="title"/>
+          </p:nvPr>
+        </p:nvSpPr>
+        <p:spPr>
+          <a:xfrm>
+            <a:off x="643464" y="4562167"/>
+            <a:ext cx="10905069" cy="1150373"/>
+          </a:xfrm>
+        </p:spPr>
+        <p:txBody>
+          <a:bodyPr vert="horz" lIns="91440" tIns="45720" rIns="91440" bIns="45720" rtlCol="0" anchor="b">
+            <a:normAutofit/>
+          </a:bodyPr>
+          <a:lstStyle/>
+          <a:p>
+            <a:pPr algn="r"/>
+            <a:r>
+              <a:rPr lang="en-US" sz="4800" cap="all"/>
+              <a:t>DISPATCH ACTIONS TO MODIFY STATE</a:t>
+            </a:r>
+          </a:p>
+        </p:txBody>
+      </p:sp>
+    </p:spTree>
+    <p:extLst>
+      <p:ext uri="{BB962C8B-B14F-4D97-AF65-F5344CB8AC3E}">
+        <p14:creationId xmlns:p14="http://schemas.microsoft.com/office/powerpoint/2010/main" val="1374297268"/>
+      </p:ext>
+    </p:extLst>
+  </p:cSld>
+  <p:clrMapOvr>
+    <a:masterClrMapping/>
+  </p:clrMapOvr>
+</p:sld>
+</file>
+
+<file path=ppt/slides/slide9.xml><?xml version="1.0" encoding="utf-8"?>
+<p:sld xmlns:a="http://schemas.openxmlformats.org/drawingml/2006/main" xmlns:r="http://schemas.openxmlformats.org/officeDocument/2006/relationships" xmlns:p="http://schemas.openxmlformats.org/presentationml/2006/main">
+  <p:cSld>
+    <p:bg>
+      <p:bgPr>
+        <a:blipFill>
+          <a:blip r:embed="rId2">
+            <a:extLst/>
+          </a:blip>
+          <a:stretch/>
+        </a:blipFill>
+        <a:effectLst/>
+      </p:bgPr>
+    </p:bg>
+    <p:spTree>
+      <p:nvGrpSpPr>
+        <p:cNvPr id="1" name=""/>
+        <p:cNvGrpSpPr/>
+        <p:nvPr/>
+      </p:nvGrpSpPr>
+      <p:grpSpPr>
+        <a:xfrm>
+          <a:off x="0" y="0"/>
+          <a:ext cx="0" cy="0"/>
+          <a:chOff x="0" y="0"/>
+          <a:chExt cx="0" cy="0"/>
+        </a:xfrm>
+      </p:grpSpPr>
+      <p:pic>
+        <p:nvPicPr>
+          <p:cNvPr id="95" name="Picture 8">
+            <a:extLst>
+              <a:ext uri="{FF2B5EF4-FFF2-40B4-BE49-F238E27FC236}">
+                <a16:creationId xmlns:a16="http://schemas.microsoft.com/office/drawing/2014/main" id="{4432DA31-8308-4F44-87C4-068169AA4DCA}"/>
+              </a:ext>
+              <a:ext uri="{C183D7F6-B498-43B3-948B-1728B52AA6E4}">
+                <adec:decorative xmlns:adec="http://schemas.microsoft.com/office/drawing/2017/decorative" val="1"/>
+              </a:ext>
+            </a:extLst>
+          </p:cNvPr>
+          <p:cNvPicPr>
+            <a:picLocks noGrp="1" noRot="1" noChangeAspect="1" noMove="1" noResize="1" noEditPoints="1" noAdjustHandles="1" noChangeArrowheads="1" noChangeShapeType="1" noCrop="1"/>
+          </p:cNvPicPr>
+          <p:nvPr>
+            <p:extLst>
+              <p:ext uri="{386F3935-93C4-4BCD-93E2-E3B085C9AB24}">
+                <p16:designElem xmlns:p16="http://schemas.microsoft.com/office/powerpoint/2015/main" val="1"/>
+              </p:ext>
+            </p:extLst>
+          </p:nvPr>
+        </p:nvPicPr>
+        <p:blipFill>
+          <a:blip r:embed="rId3">
+            <a:extLst>
+              <a:ext uri="{28A0092B-C50C-407E-A947-70E740481C1C}">
+                <a14:useLocalDpi xmlns:a14="http://schemas.microsoft.com/office/drawing/2010/main" val="0"/>
+              </a:ext>
+            </a:extLst>
+          </a:blip>
+          <a:stretch>
+            <a:fillRect/>
+          </a:stretch>
+        </p:blipFill>
+        <p:spPr>
+          <a:xfrm>
+            <a:off x="0" y="0"/>
+            <a:ext cx="12188825" cy="6856214"/>
+          </a:xfrm>
+          <a:prstGeom prst="rect">
+            <a:avLst/>
+          </a:prstGeom>
+        </p:spPr>
+      </p:pic>
+      <p:pic>
+        <p:nvPicPr>
+          <p:cNvPr id="4" name="Picture 3">
+            <a:extLst>
+              <a:ext uri="{FF2B5EF4-FFF2-40B4-BE49-F238E27FC236}">
+                <a16:creationId xmlns:a16="http://schemas.microsoft.com/office/drawing/2014/main" id="{36BD1B37-B0D3-4B11-9E8F-58052300D09F}"/>
+              </a:ext>
+            </a:extLst>
+          </p:cNvPr>
+          <p:cNvPicPr>
+            <a:picLocks noChangeAspect="1"/>
+          </p:cNvPicPr>
+          <p:nvPr/>
+        </p:nvPicPr>
+        <p:blipFill>
+          <a:blip r:embed="rId4"/>
+          <a:stretch>
+            <a:fillRect/>
+          </a:stretch>
+        </p:blipFill>
+        <p:spPr>
+          <a:xfrm>
+            <a:off x="1100301" y="1125121"/>
+            <a:ext cx="10287886" cy="2109016"/>
+          </a:xfrm>
+          <a:prstGeom prst="roundRect">
+            <a:avLst>
+              <a:gd name="adj" fmla="val 4380"/>
+            </a:avLst>
+          </a:prstGeom>
+          <a:ln w="50800" cap="sq" cmpd="dbl">
+            <a:gradFill flip="none" rotWithShape="1">
+              <a:gsLst>
+                <a:gs pos="0">
+                  <a:srgbClr val="FFFFFF"/>
+                </a:gs>
+                <a:gs pos="100000">
+                  <a:schemeClr val="tx1">
+                    <a:alpha val="0"/>
+                  </a:schemeClr>
+                </a:gs>
+              </a:gsLst>
+              <a:path path="circle">
+                <a:fillToRect l="50000" t="50000" r="50000" b="50000"/>
+              </a:path>
+              <a:tileRect/>
+            </a:gradFill>
+            <a:miter lim="800000"/>
+          </a:ln>
+          <a:effectLst>
+            <a:outerShdw blurRad="254000" algn="tl" rotWithShape="0">
+              <a:srgbClr val="000000">
+                <a:alpha val="43000"/>
+              </a:srgbClr>
+            </a:outerShdw>
+          </a:effectLst>
+        </p:spPr>
+      </p:pic>
+      <p:sp>
+        <p:nvSpPr>
+          <p:cNvPr id="2" name="Title 1">
+            <a:extLst>
+              <a:ext uri="{FF2B5EF4-FFF2-40B4-BE49-F238E27FC236}">
+                <a16:creationId xmlns:a16="http://schemas.microsoft.com/office/drawing/2014/main" id="{DAAC4BBB-17CA-4F7B-8663-0B7A62762AB9}"/>
+              </a:ext>
+            </a:extLst>
+          </p:cNvPr>
+          <p:cNvSpPr>
+            <a:spLocks noGrp="1"/>
+          </p:cNvSpPr>
+          <p:nvPr>
+            <p:ph type="title"/>
+          </p:nvPr>
+        </p:nvSpPr>
+        <p:spPr>
+          <a:xfrm>
+            <a:off x="649338" y="3765754"/>
+            <a:ext cx="10903565" cy="1504335"/>
+          </a:xfrm>
+        </p:spPr>
+        <p:txBody>
+          <a:bodyPr vert="horz" lIns="91440" tIns="45720" rIns="91440" bIns="45720" rtlCol="0" anchor="b">
+            <a:normAutofit/>
+          </a:bodyPr>
+          <a:lstStyle/>
+          <a:p>
+            <a:pPr algn="ctr"/>
+            <a:r>
+              <a:rPr lang="en-US" sz="4800" cap="all"/>
+              <a:t>Tell reducer how to handle action</a:t>
+            </a:r>
+          </a:p>
+        </p:txBody>
+      </p:sp>
+    </p:spTree>
+    <p:extLst>
+      <p:ext uri="{BB962C8B-B14F-4D97-AF65-F5344CB8AC3E}">
+        <p14:creationId xmlns:p14="http://schemas.microsoft.com/office/powerpoint/2010/main" val="3137620261"/>
+      </p:ext>
+    </p:extLst>
+  </p:cSld>
+  <p:clrMapOvr>
+    <a:masterClrMapping/>
+  </p:clrMapOvr>
 </p:sld>
 </file>
 

</xml_diff>

<commit_message>
fix some ModalFactory bugs
</commit_message>
<xml_diff>
--- a/Redux/Another Redux Talk.pptx
+++ b/Redux/Another Redux Talk.pptx
@@ -14,10 +14,11 @@
     <p:sldId id="268" r:id="rId8"/>
     <p:sldId id="269" r:id="rId9"/>
     <p:sldId id="270" r:id="rId10"/>
-    <p:sldId id="266" r:id="rId11"/>
-    <p:sldId id="265" r:id="rId12"/>
-    <p:sldId id="264" r:id="rId13"/>
-    <p:sldId id="262" r:id="rId14"/>
+    <p:sldId id="271" r:id="rId11"/>
+    <p:sldId id="266" r:id="rId12"/>
+    <p:sldId id="265" r:id="rId13"/>
+    <p:sldId id="264" r:id="rId14"/>
+    <p:sldId id="262" r:id="rId15"/>
   </p:sldIdLst>
   <p:sldSz cx="12192000" cy="6858000"/>
   <p:notesSz cx="6858000" cy="9144000"/>
@@ -5873,6 +5874,288 @@
 <file path=ppt/slides/slide10.xml><?xml version="1.0" encoding="utf-8"?>
 <p:sld xmlns:a="http://schemas.openxmlformats.org/drawingml/2006/main" xmlns:r="http://schemas.openxmlformats.org/officeDocument/2006/relationships" xmlns:p="http://schemas.openxmlformats.org/presentationml/2006/main">
   <p:cSld>
+    <p:spTree>
+      <p:nvGrpSpPr>
+        <p:cNvPr id="1" name=""/>
+        <p:cNvGrpSpPr/>
+        <p:nvPr/>
+      </p:nvGrpSpPr>
+      <p:grpSpPr>
+        <a:xfrm>
+          <a:off x="0" y="0"/>
+          <a:ext cx="0" cy="0"/>
+          <a:chOff x="0" y="0"/>
+          <a:chExt cx="0" cy="0"/>
+        </a:xfrm>
+      </p:grpSpPr>
+      <p:sp>
+        <p:nvSpPr>
+          <p:cNvPr id="2" name="Title 1">
+            <a:extLst>
+              <a:ext uri="{FF2B5EF4-FFF2-40B4-BE49-F238E27FC236}">
+                <a16:creationId xmlns:a16="http://schemas.microsoft.com/office/drawing/2014/main" id="{B74DD701-4487-4A08-A3E8-AEF93F80B747}"/>
+              </a:ext>
+            </a:extLst>
+          </p:cNvPr>
+          <p:cNvSpPr>
+            <a:spLocks noGrp="1"/>
+          </p:cNvSpPr>
+          <p:nvPr>
+            <p:ph type="title"/>
+          </p:nvPr>
+        </p:nvSpPr>
+        <p:spPr/>
+        <p:txBody>
+          <a:bodyPr/>
+          <a:lstStyle/>
+          <a:p>
+            <a:r>
+              <a:rPr lang="en-US" dirty="0"/>
+              <a:t>Action Reducers in Redux</a:t>
+            </a:r>
+            <a:endParaRPr lang="en-ZA" dirty="0"/>
+          </a:p>
+        </p:txBody>
+      </p:sp>
+      <p:sp>
+        <p:nvSpPr>
+          <p:cNvPr id="3" name="Content Placeholder 2">
+            <a:extLst>
+              <a:ext uri="{FF2B5EF4-FFF2-40B4-BE49-F238E27FC236}">
+                <a16:creationId xmlns:a16="http://schemas.microsoft.com/office/drawing/2014/main" id="{079DD4A3-0120-4A4B-A890-1426EC9A583B}"/>
+              </a:ext>
+            </a:extLst>
+          </p:cNvPr>
+          <p:cNvSpPr>
+            <a:spLocks noGrp="1"/>
+          </p:cNvSpPr>
+          <p:nvPr>
+            <p:ph idx="1"/>
+          </p:nvPr>
+        </p:nvSpPr>
+        <p:spPr/>
+        <p:txBody>
+          <a:bodyPr/>
+          <a:lstStyle/>
+          <a:p>
+            <a:r>
+              <a:rPr lang="en-US" dirty="0"/>
+              <a:t>Take an action and a state, return a new state</a:t>
+            </a:r>
+          </a:p>
+          <a:p>
+            <a:r>
+              <a:rPr lang="en-US" dirty="0"/>
+              <a:t>Your application state is a reduction of the actions</a:t>
+            </a:r>
+          </a:p>
+          <a:p>
+            <a:r>
+              <a:rPr lang="en-US" dirty="0"/>
+              <a:t>Each reducer operates on a subset of the global state</a:t>
+            </a:r>
+          </a:p>
+          <a:p>
+            <a:pPr marL="0" indent="0">
+              <a:buNone/>
+            </a:pPr>
+            <a:endParaRPr lang="en-ZA" dirty="0"/>
+          </a:p>
+        </p:txBody>
+      </p:sp>
+    </p:spTree>
+    <p:extLst>
+      <p:ext uri="{BB962C8B-B14F-4D97-AF65-F5344CB8AC3E}">
+        <p14:creationId xmlns:p14="http://schemas.microsoft.com/office/powerpoint/2010/main" val="3209049757"/>
+      </p:ext>
+    </p:extLst>
+  </p:cSld>
+  <p:clrMapOvr>
+    <a:masterClrMapping/>
+  </p:clrMapOvr>
+  <p:timing>
+    <p:tnLst>
+      <p:par>
+        <p:cTn id="1" dur="indefinite" restart="never" nodeType="tmRoot">
+          <p:childTnLst>
+            <p:seq concurrent="1" nextAc="seek">
+              <p:cTn id="2" dur="indefinite" nodeType="mainSeq">
+                <p:childTnLst>
+                  <p:par>
+                    <p:cTn id="3" fill="hold">
+                      <p:stCondLst>
+                        <p:cond delay="indefinite"/>
+                      </p:stCondLst>
+                      <p:childTnLst>
+                        <p:par>
+                          <p:cTn id="4" fill="hold">
+                            <p:stCondLst>
+                              <p:cond delay="0"/>
+                            </p:stCondLst>
+                            <p:childTnLst>
+                              <p:par>
+                                <p:cTn id="5" presetID="1" presetClass="entr" presetSubtype="0" fill="hold" nodeType="clickEffect">
+                                  <p:stCondLst>
+                                    <p:cond delay="0"/>
+                                  </p:stCondLst>
+                                  <p:childTnLst>
+                                    <p:set>
+                                      <p:cBhvr>
+                                        <p:cTn id="6" dur="1" fill="hold">
+                                          <p:stCondLst>
+                                            <p:cond delay="0"/>
+                                          </p:stCondLst>
+                                        </p:cTn>
+                                        <p:tgtEl>
+                                          <p:spTgt spid="3">
+                                            <p:txEl>
+                                              <p:pRg st="0" end="0"/>
+                                            </p:txEl>
+                                          </p:spTgt>
+                                        </p:tgtEl>
+                                        <p:attrNameLst>
+                                          <p:attrName>style.visibility</p:attrName>
+                                        </p:attrNameLst>
+                                      </p:cBhvr>
+                                      <p:to>
+                                        <p:strVal val="visible"/>
+                                      </p:to>
+                                    </p:set>
+                                  </p:childTnLst>
+                                </p:cTn>
+                              </p:par>
+                            </p:childTnLst>
+                          </p:cTn>
+                        </p:par>
+                      </p:childTnLst>
+                    </p:cTn>
+                  </p:par>
+                  <p:par>
+                    <p:cTn id="7" fill="hold">
+                      <p:stCondLst>
+                        <p:cond delay="indefinite"/>
+                      </p:stCondLst>
+                      <p:childTnLst>
+                        <p:par>
+                          <p:cTn id="8" fill="hold">
+                            <p:stCondLst>
+                              <p:cond delay="0"/>
+                            </p:stCondLst>
+                            <p:childTnLst>
+                              <p:par>
+                                <p:cTn id="9" presetID="1" presetClass="entr" presetSubtype="0" fill="hold" nodeType="clickEffect">
+                                  <p:stCondLst>
+                                    <p:cond delay="0"/>
+                                  </p:stCondLst>
+                                  <p:childTnLst>
+                                    <p:set>
+                                      <p:cBhvr>
+                                        <p:cTn id="10" dur="1" fill="hold">
+                                          <p:stCondLst>
+                                            <p:cond delay="0"/>
+                                          </p:stCondLst>
+                                        </p:cTn>
+                                        <p:tgtEl>
+                                          <p:spTgt spid="3">
+                                            <p:txEl>
+                                              <p:pRg st="1" end="1"/>
+                                            </p:txEl>
+                                          </p:spTgt>
+                                        </p:tgtEl>
+                                        <p:attrNameLst>
+                                          <p:attrName>style.visibility</p:attrName>
+                                        </p:attrNameLst>
+                                      </p:cBhvr>
+                                      <p:to>
+                                        <p:strVal val="visible"/>
+                                      </p:to>
+                                    </p:set>
+                                  </p:childTnLst>
+                                </p:cTn>
+                              </p:par>
+                            </p:childTnLst>
+                          </p:cTn>
+                        </p:par>
+                      </p:childTnLst>
+                    </p:cTn>
+                  </p:par>
+                  <p:par>
+                    <p:cTn id="11" fill="hold">
+                      <p:stCondLst>
+                        <p:cond delay="indefinite"/>
+                      </p:stCondLst>
+                      <p:childTnLst>
+                        <p:par>
+                          <p:cTn id="12" fill="hold">
+                            <p:stCondLst>
+                              <p:cond delay="0"/>
+                            </p:stCondLst>
+                            <p:childTnLst>
+                              <p:par>
+                                <p:cTn id="13" presetID="1" presetClass="entr" presetSubtype="0" fill="hold" nodeType="clickEffect">
+                                  <p:stCondLst>
+                                    <p:cond delay="0"/>
+                                  </p:stCondLst>
+                                  <p:childTnLst>
+                                    <p:set>
+                                      <p:cBhvr>
+                                        <p:cTn id="14" dur="1" fill="hold">
+                                          <p:stCondLst>
+                                            <p:cond delay="0"/>
+                                          </p:stCondLst>
+                                        </p:cTn>
+                                        <p:tgtEl>
+                                          <p:spTgt spid="3">
+                                            <p:txEl>
+                                              <p:pRg st="2" end="2"/>
+                                            </p:txEl>
+                                          </p:spTgt>
+                                        </p:tgtEl>
+                                        <p:attrNameLst>
+                                          <p:attrName>style.visibility</p:attrName>
+                                        </p:attrNameLst>
+                                      </p:cBhvr>
+                                      <p:to>
+                                        <p:strVal val="visible"/>
+                                      </p:to>
+                                    </p:set>
+                                  </p:childTnLst>
+                                </p:cTn>
+                              </p:par>
+                            </p:childTnLst>
+                          </p:cTn>
+                        </p:par>
+                      </p:childTnLst>
+                    </p:cTn>
+                  </p:par>
+                </p:childTnLst>
+              </p:cTn>
+              <p:prevCondLst>
+                <p:cond evt="onPrev" delay="0">
+                  <p:tgtEl>
+                    <p:sldTgt/>
+                  </p:tgtEl>
+                </p:cond>
+              </p:prevCondLst>
+              <p:nextCondLst>
+                <p:cond evt="onNext" delay="0">
+                  <p:tgtEl>
+                    <p:sldTgt/>
+                  </p:tgtEl>
+                </p:cond>
+              </p:nextCondLst>
+            </p:seq>
+          </p:childTnLst>
+        </p:cTn>
+      </p:par>
+    </p:tnLst>
+  </p:timing>
+</p:sld>
+</file>
+
+<file path=ppt/slides/slide11.xml><?xml version="1.0" encoding="utf-8"?>
+<p:sld xmlns:a="http://schemas.openxmlformats.org/drawingml/2006/main" xmlns:r="http://schemas.openxmlformats.org/officeDocument/2006/relationships" xmlns:p="http://schemas.openxmlformats.org/presentationml/2006/main">
+  <p:cSld>
     <p:bg>
       <p:bgPr>
         <a:blipFill>
@@ -6067,7 +6350,7 @@
 </p:sld>
 </file>
 
-<file path=ppt/slides/slide11.xml><?xml version="1.0" encoding="utf-8"?>
+<file path=ppt/slides/slide12.xml><?xml version="1.0" encoding="utf-8"?>
 <p:sld xmlns:a="http://schemas.openxmlformats.org/drawingml/2006/main" xmlns:r="http://schemas.openxmlformats.org/officeDocument/2006/relationships" xmlns:p="http://schemas.openxmlformats.org/presentationml/2006/main">
   <p:cSld>
     <p:bg>
@@ -6247,7 +6530,7 @@
 </p:sld>
 </file>
 
-<file path=ppt/slides/slide12.xml><?xml version="1.0" encoding="utf-8"?>
+<file path=ppt/slides/slide13.xml><?xml version="1.0" encoding="utf-8"?>
 <p:sld xmlns:a="http://schemas.openxmlformats.org/drawingml/2006/main" xmlns:r="http://schemas.openxmlformats.org/officeDocument/2006/relationships" xmlns:p="http://schemas.openxmlformats.org/presentationml/2006/main">
   <p:cSld>
     <p:bg>
@@ -6427,7 +6710,7 @@
 </p:sld>
 </file>
 
-<file path=ppt/slides/slide13.xml><?xml version="1.0" encoding="utf-8"?>
+<file path=ppt/slides/slide14.xml><?xml version="1.0" encoding="utf-8"?>
 <p:sld xmlns:a="http://schemas.openxmlformats.org/drawingml/2006/main" xmlns:r="http://schemas.openxmlformats.org/officeDocument/2006/relationships" xmlns:p="http://schemas.openxmlformats.org/presentationml/2006/main">
   <p:cSld>
     <p:spTree>

</xml_diff>